<commit_message>
Update the system model
</commit_message>
<xml_diff>
--- a/ipsj/figure/SystemModel.pptx
+++ b/ipsj/figure/SystemModel.pptx
@@ -197,7 +197,7 @@
           <a:p>
             <a:fld id="{00D06802-B8EF-4FD8-9511-F1F928CF3A55}" type="datetimeFigureOut">
               <a:rPr kumimoji="1" lang="ja-JP" altLang="en-US" smtClean="0"/>
-              <a:t>2017/11/7</a:t>
+              <a:t>2017/11/16</a:t>
             </a:fld>
             <a:endParaRPr kumimoji="1" lang="ja-JP" altLang="en-US"/>
           </a:p>
@@ -628,7 +628,7 @@
           <a:p>
             <a:fld id="{AA641DB4-C951-4763-94FC-F650C3AA7E65}" type="datetimeFigureOut">
               <a:rPr kumimoji="1" lang="ja-JP" altLang="en-US" smtClean="0"/>
-              <a:t>2017/11/7</a:t>
+              <a:t>2017/11/16</a:t>
             </a:fld>
             <a:endParaRPr kumimoji="1" lang="ja-JP" altLang="en-US"/>
           </a:p>
@@ -830,7 +830,7 @@
           <a:p>
             <a:fld id="{AA641DB4-C951-4763-94FC-F650C3AA7E65}" type="datetimeFigureOut">
               <a:rPr kumimoji="1" lang="ja-JP" altLang="en-US" smtClean="0"/>
-              <a:t>2017/11/7</a:t>
+              <a:t>2017/11/16</a:t>
             </a:fld>
             <a:endParaRPr kumimoji="1" lang="ja-JP" altLang="en-US"/>
           </a:p>
@@ -1042,7 +1042,7 @@
           <a:p>
             <a:fld id="{AA641DB4-C951-4763-94FC-F650C3AA7E65}" type="datetimeFigureOut">
               <a:rPr kumimoji="1" lang="ja-JP" altLang="en-US" smtClean="0"/>
-              <a:t>2017/11/7</a:t>
+              <a:t>2017/11/16</a:t>
             </a:fld>
             <a:endParaRPr kumimoji="1" lang="ja-JP" altLang="en-US"/>
           </a:p>
@@ -1244,7 +1244,7 @@
           <a:p>
             <a:fld id="{AA641DB4-C951-4763-94FC-F650C3AA7E65}" type="datetimeFigureOut">
               <a:rPr kumimoji="1" lang="ja-JP" altLang="en-US" smtClean="0"/>
-              <a:t>2017/11/7</a:t>
+              <a:t>2017/11/16</a:t>
             </a:fld>
             <a:endParaRPr kumimoji="1" lang="ja-JP" altLang="en-US"/>
           </a:p>
@@ -1488,7 +1488,7 @@
           <a:p>
             <a:fld id="{AA641DB4-C951-4763-94FC-F650C3AA7E65}" type="datetimeFigureOut">
               <a:rPr kumimoji="1" lang="ja-JP" altLang="en-US" smtClean="0"/>
-              <a:t>2017/11/7</a:t>
+              <a:t>2017/11/16</a:t>
             </a:fld>
             <a:endParaRPr kumimoji="1" lang="ja-JP" altLang="en-US"/>
           </a:p>
@@ -1784,7 +1784,7 @@
           <a:p>
             <a:fld id="{AA641DB4-C951-4763-94FC-F650C3AA7E65}" type="datetimeFigureOut">
               <a:rPr kumimoji="1" lang="ja-JP" altLang="en-US" smtClean="0"/>
-              <a:t>2017/11/7</a:t>
+              <a:t>2017/11/16</a:t>
             </a:fld>
             <a:endParaRPr kumimoji="1" lang="ja-JP" altLang="en-US"/>
           </a:p>
@@ -2215,7 +2215,7 @@
           <a:p>
             <a:fld id="{AA641DB4-C951-4763-94FC-F650C3AA7E65}" type="datetimeFigureOut">
               <a:rPr kumimoji="1" lang="ja-JP" altLang="en-US" smtClean="0"/>
-              <a:t>2017/11/7</a:t>
+              <a:t>2017/11/16</a:t>
             </a:fld>
             <a:endParaRPr kumimoji="1" lang="ja-JP" altLang="en-US"/>
           </a:p>
@@ -2333,7 +2333,7 @@
           <a:p>
             <a:fld id="{AA641DB4-C951-4763-94FC-F650C3AA7E65}" type="datetimeFigureOut">
               <a:rPr kumimoji="1" lang="ja-JP" altLang="en-US" smtClean="0"/>
-              <a:t>2017/11/7</a:t>
+              <a:t>2017/11/16</a:t>
             </a:fld>
             <a:endParaRPr kumimoji="1" lang="ja-JP" altLang="en-US"/>
           </a:p>
@@ -2428,7 +2428,7 @@
           <a:p>
             <a:fld id="{AA641DB4-C951-4763-94FC-F650C3AA7E65}" type="datetimeFigureOut">
               <a:rPr kumimoji="1" lang="ja-JP" altLang="en-US" smtClean="0"/>
-              <a:t>2017/11/7</a:t>
+              <a:t>2017/11/16</a:t>
             </a:fld>
             <a:endParaRPr kumimoji="1" lang="ja-JP" altLang="en-US"/>
           </a:p>
@@ -2737,7 +2737,7 @@
           <a:p>
             <a:fld id="{AA641DB4-C951-4763-94FC-F650C3AA7E65}" type="datetimeFigureOut">
               <a:rPr kumimoji="1" lang="ja-JP" altLang="en-US" smtClean="0"/>
-              <a:t>2017/11/7</a:t>
+              <a:t>2017/11/16</a:t>
             </a:fld>
             <a:endParaRPr kumimoji="1" lang="ja-JP" altLang="en-US"/>
           </a:p>
@@ -2994,7 +2994,7 @@
           <a:p>
             <a:fld id="{AA641DB4-C951-4763-94FC-F650C3AA7E65}" type="datetimeFigureOut">
               <a:rPr kumimoji="1" lang="ja-JP" altLang="en-US" smtClean="0"/>
-              <a:t>2017/11/7</a:t>
+              <a:t>2017/11/16</a:t>
             </a:fld>
             <a:endParaRPr kumimoji="1" lang="ja-JP" altLang="en-US"/>
           </a:p>
@@ -3239,7 +3239,7 @@
           <a:p>
             <a:fld id="{AA641DB4-C951-4763-94FC-F650C3AA7E65}" type="datetimeFigureOut">
               <a:rPr kumimoji="1" lang="ja-JP" altLang="en-US" smtClean="0"/>
-              <a:t>2017/11/7</a:t>
+              <a:t>2017/11/16</a:t>
             </a:fld>
             <a:endParaRPr kumimoji="1" lang="ja-JP" altLang="en-US"/>
           </a:p>
@@ -4918,6 +4918,102 @@
           </p:txBody>
         </p:sp>
       </p:grpSp>
+      <p:sp>
+        <p:nvSpPr>
+          <p:cNvPr id="22" name="角丸四角形 21"/>
+          <p:cNvSpPr/>
+          <p:nvPr/>
+        </p:nvSpPr>
+        <p:spPr>
+          <a:xfrm>
+            <a:off x="14882453" y="1831326"/>
+            <a:ext cx="3172084" cy="1123712"/>
+          </a:xfrm>
+          <a:prstGeom prst="roundRect">
+            <a:avLst/>
+          </a:prstGeom>
+          <a:solidFill>
+            <a:schemeClr val="bg1">
+              <a:lumMod val="95000"/>
+            </a:schemeClr>
+          </a:solidFill>
+          <a:ln>
+            <a:solidFill>
+              <a:schemeClr val="tx1"/>
+            </a:solidFill>
+          </a:ln>
+        </p:spPr>
+        <p:txBody>
+          <a:bodyPr wrap="square">
+            <a:spAutoFit/>
+          </a:bodyPr>
+          <a:lstStyle/>
+          <a:p>
+            <a:r>
+              <a:rPr lang="en-US" altLang="ja-JP" sz="6000" kern="100" dirty="0" smtClean="0">
+                <a:latin typeface="Century" panose="02040604050505020304" pitchFamily="18" charset="0"/>
+                <a:ea typeface="ＭＳ 明朝" panose="02020609040205080304" pitchFamily="17" charset="-128"/>
+                <a:cs typeface="Times New Roman" panose="02020603050405020304" pitchFamily="18" charset="0"/>
+              </a:rPr>
+              <a:t>Sec. 3.1</a:t>
+            </a:r>
+            <a:endParaRPr lang="ja-JP" altLang="ja-JP" sz="6000" kern="100" dirty="0">
+              <a:effectLst/>
+              <a:latin typeface="Century" panose="02040604050505020304" pitchFamily="18" charset="0"/>
+              <a:ea typeface="ＭＳ 明朝" panose="02020609040205080304" pitchFamily="17" charset="-128"/>
+              <a:cs typeface="Times New Roman" panose="02020603050405020304" pitchFamily="18" charset="0"/>
+            </a:endParaRPr>
+          </a:p>
+        </p:txBody>
+      </p:sp>
+      <p:sp>
+        <p:nvSpPr>
+          <p:cNvPr id="23" name="角丸四角形 22"/>
+          <p:cNvSpPr/>
+          <p:nvPr/>
+        </p:nvSpPr>
+        <p:spPr>
+          <a:xfrm>
+            <a:off x="436592" y="10465762"/>
+            <a:ext cx="3172084" cy="1123712"/>
+          </a:xfrm>
+          <a:prstGeom prst="roundRect">
+            <a:avLst/>
+          </a:prstGeom>
+          <a:solidFill>
+            <a:schemeClr val="bg1">
+              <a:lumMod val="95000"/>
+            </a:schemeClr>
+          </a:solidFill>
+          <a:ln>
+            <a:solidFill>
+              <a:schemeClr val="tx1"/>
+            </a:solidFill>
+          </a:ln>
+        </p:spPr>
+        <p:txBody>
+          <a:bodyPr wrap="square">
+            <a:spAutoFit/>
+          </a:bodyPr>
+          <a:lstStyle/>
+          <a:p>
+            <a:r>
+              <a:rPr lang="en-US" altLang="ja-JP" sz="6000" kern="100" dirty="0" smtClean="0">
+                <a:latin typeface="Century" panose="02040604050505020304" pitchFamily="18" charset="0"/>
+                <a:ea typeface="ＭＳ 明朝" panose="02020609040205080304" pitchFamily="17" charset="-128"/>
+                <a:cs typeface="Times New Roman" panose="02020603050405020304" pitchFamily="18" charset="0"/>
+              </a:rPr>
+              <a:t>Sec. 3.2</a:t>
+            </a:r>
+            <a:endParaRPr lang="ja-JP" altLang="ja-JP" sz="6000" kern="100" dirty="0">
+              <a:effectLst/>
+              <a:latin typeface="Century" panose="02040604050505020304" pitchFamily="18" charset="0"/>
+              <a:ea typeface="ＭＳ 明朝" panose="02020609040205080304" pitchFamily="17" charset="-128"/>
+              <a:cs typeface="Times New Roman" panose="02020603050405020304" pitchFamily="18" charset="0"/>
+            </a:endParaRPr>
+          </a:p>
+        </p:txBody>
+      </p:sp>
     </p:spTree>
     <p:extLst>
       <p:ext uri="{BB962C8B-B14F-4D97-AF65-F5344CB8AC3E}">

</xml_diff>